<commit_message>
presentation added ROC and AUC
</commit_message>
<xml_diff>
--- a/Research Presentation.pptx
+++ b/Research Presentation.pptx
@@ -5,7 +5,7 @@
     <p:sldMasterId id="2147483783" r:id="rId1"/>
   </p:sldMasterIdLst>
   <p:notesMasterIdLst>
-    <p:notesMasterId r:id="rId12"/>
+    <p:notesMasterId r:id="rId15"/>
   </p:notesMasterIdLst>
   <p:sldIdLst>
     <p:sldId id="256" r:id="rId2"/>
@@ -15,9 +15,12 @@
     <p:sldId id="261" r:id="rId6"/>
     <p:sldId id="260" r:id="rId7"/>
     <p:sldId id="265" r:id="rId8"/>
-    <p:sldId id="264" r:id="rId9"/>
-    <p:sldId id="263" r:id="rId10"/>
-    <p:sldId id="257" r:id="rId11"/>
+    <p:sldId id="266" r:id="rId9"/>
+    <p:sldId id="264" r:id="rId10"/>
+    <p:sldId id="267" r:id="rId11"/>
+    <p:sldId id="263" r:id="rId12"/>
+    <p:sldId id="268" r:id="rId13"/>
+    <p:sldId id="257" r:id="rId14"/>
   </p:sldIdLst>
   <p:sldSz cx="12192000" cy="6858000"/>
   <p:notesSz cx="6858000" cy="9144000"/>
@@ -634,7 +637,16 @@
           <a:bodyPr/>
           <a:lstStyle/>
           <a:p>
-            <a:endParaRPr lang="en-US" dirty="0"/>
+            <a:r>
+              <a:rPr lang="en-US" dirty="0"/>
+              <a:t>Discuss about how they gathered their data and how they used the Pattern discussed on the previous slide to get proper Zinc Finger Samples</a:t>
+            </a:r>
+          </a:p>
+          <a:p>
+            <a:r>
+              <a:rPr lang="en-US" dirty="0"/>
+              <a:t>Discuss their SVM approach </a:t>
+            </a:r>
           </a:p>
         </p:txBody>
       </p:sp>
@@ -655,7 +667,7 @@
           <a:p>
             <a:fld id="{60C87FF9-C822-A140-B22B-C824FCF69242}" type="slidenum">
               <a:rPr lang="en-US" smtClean="0"/>
-              <a:t>9</a:t>
+              <a:t>4</a:t>
             </a:fld>
             <a:endParaRPr lang="en-US"/>
           </a:p>
@@ -664,7 +676,7 @@
     </p:spTree>
     <p:extLst>
       <p:ext uri="{BB962C8B-B14F-4D97-AF65-F5344CB8AC3E}">
-        <p14:creationId xmlns:p14="http://schemas.microsoft.com/office/powerpoint/2010/main" val="170935215"/>
+        <p14:creationId xmlns:p14="http://schemas.microsoft.com/office/powerpoint/2010/main" val="1842848568"/>
       </p:ext>
     </p:extLst>
   </p:cSld>
@@ -739,7 +751,544 @@
           <a:p>
             <a:fld id="{60C87FF9-C822-A140-B22B-C824FCF69242}" type="slidenum">
               <a:rPr lang="en-US" smtClean="0"/>
-              <a:t>10</a:t>
+              <a:t>5</a:t>
+            </a:fld>
+            <a:endParaRPr lang="en-US"/>
+          </a:p>
+        </p:txBody>
+      </p:sp>
+    </p:spTree>
+    <p:extLst>
+      <p:ext uri="{BB962C8B-B14F-4D97-AF65-F5344CB8AC3E}">
+        <p14:creationId xmlns:p14="http://schemas.microsoft.com/office/powerpoint/2010/main" val="248765113"/>
+      </p:ext>
+    </p:extLst>
+  </p:cSld>
+  <p:clrMapOvr>
+    <a:masterClrMapping/>
+  </p:clrMapOvr>
+</p:notes>
+</file>
+
+<file path=ppt/notesSlides/notesSlide4.xml><?xml version="1.0" encoding="utf-8"?>
+<p:notes xmlns:a="http://schemas.openxmlformats.org/drawingml/2006/main" xmlns:r="http://schemas.openxmlformats.org/officeDocument/2006/relationships" xmlns:p="http://schemas.openxmlformats.org/presentationml/2006/main">
+  <p:cSld>
+    <p:spTree>
+      <p:nvGrpSpPr>
+        <p:cNvPr id="1" name=""/>
+        <p:cNvGrpSpPr/>
+        <p:nvPr/>
+      </p:nvGrpSpPr>
+      <p:grpSpPr>
+        <a:xfrm>
+          <a:off x="0" y="0"/>
+          <a:ext cx="0" cy="0"/>
+          <a:chOff x="0" y="0"/>
+          <a:chExt cx="0" cy="0"/>
+        </a:xfrm>
+      </p:grpSpPr>
+      <p:sp>
+        <p:nvSpPr>
+          <p:cNvPr id="2" name="Slide Image Placeholder 1"/>
+          <p:cNvSpPr>
+            <a:spLocks noGrp="1" noRot="1" noChangeAspect="1"/>
+          </p:cNvSpPr>
+          <p:nvPr>
+            <p:ph type="sldImg"/>
+          </p:nvPr>
+        </p:nvSpPr>
+        <p:spPr/>
+      </p:sp>
+      <p:sp>
+        <p:nvSpPr>
+          <p:cNvPr id="3" name="Notes Placeholder 2"/>
+          <p:cNvSpPr>
+            <a:spLocks noGrp="1"/>
+          </p:cNvSpPr>
+          <p:nvPr>
+            <p:ph type="body" idx="1"/>
+          </p:nvPr>
+        </p:nvSpPr>
+        <p:spPr/>
+        <p:txBody>
+          <a:bodyPr/>
+          <a:lstStyle/>
+          <a:p>
+            <a:endParaRPr lang="en-US" dirty="0"/>
+          </a:p>
+        </p:txBody>
+      </p:sp>
+      <p:sp>
+        <p:nvSpPr>
+          <p:cNvPr id="4" name="Slide Number Placeholder 3"/>
+          <p:cNvSpPr>
+            <a:spLocks noGrp="1"/>
+          </p:cNvSpPr>
+          <p:nvPr>
+            <p:ph type="sldNum" sz="quarter" idx="5"/>
+          </p:nvPr>
+        </p:nvSpPr>
+        <p:spPr/>
+        <p:txBody>
+          <a:bodyPr/>
+          <a:lstStyle/>
+          <a:p>
+            <a:fld id="{60C87FF9-C822-A140-B22B-C824FCF69242}" type="slidenum">
+              <a:rPr lang="en-US" smtClean="0"/>
+              <a:t>6</a:t>
+            </a:fld>
+            <a:endParaRPr lang="en-US"/>
+          </a:p>
+        </p:txBody>
+      </p:sp>
+    </p:spTree>
+    <p:extLst>
+      <p:ext uri="{BB962C8B-B14F-4D97-AF65-F5344CB8AC3E}">
+        <p14:creationId xmlns:p14="http://schemas.microsoft.com/office/powerpoint/2010/main" val="1354632160"/>
+      </p:ext>
+    </p:extLst>
+  </p:cSld>
+  <p:clrMapOvr>
+    <a:masterClrMapping/>
+  </p:clrMapOvr>
+</p:notes>
+</file>
+
+<file path=ppt/notesSlides/notesSlide5.xml><?xml version="1.0" encoding="utf-8"?>
+<p:notes xmlns:a="http://schemas.openxmlformats.org/drawingml/2006/main" xmlns:r="http://schemas.openxmlformats.org/officeDocument/2006/relationships" xmlns:p="http://schemas.openxmlformats.org/presentationml/2006/main">
+  <p:cSld>
+    <p:spTree>
+      <p:nvGrpSpPr>
+        <p:cNvPr id="1" name=""/>
+        <p:cNvGrpSpPr/>
+        <p:nvPr/>
+      </p:nvGrpSpPr>
+      <p:grpSpPr>
+        <a:xfrm>
+          <a:off x="0" y="0"/>
+          <a:ext cx="0" cy="0"/>
+          <a:chOff x="0" y="0"/>
+          <a:chExt cx="0" cy="0"/>
+        </a:xfrm>
+      </p:grpSpPr>
+      <p:sp>
+        <p:nvSpPr>
+          <p:cNvPr id="2" name="Slide Image Placeholder 1"/>
+          <p:cNvSpPr>
+            <a:spLocks noGrp="1" noRot="1" noChangeAspect="1"/>
+          </p:cNvSpPr>
+          <p:nvPr>
+            <p:ph type="sldImg"/>
+          </p:nvPr>
+        </p:nvSpPr>
+        <p:spPr/>
+      </p:sp>
+      <p:sp>
+        <p:nvSpPr>
+          <p:cNvPr id="3" name="Notes Placeholder 2"/>
+          <p:cNvSpPr>
+            <a:spLocks noGrp="1"/>
+          </p:cNvSpPr>
+          <p:nvPr>
+            <p:ph type="body" idx="1"/>
+          </p:nvPr>
+        </p:nvSpPr>
+        <p:spPr/>
+        <p:txBody>
+          <a:bodyPr/>
+          <a:lstStyle/>
+          <a:p>
+            <a:r>
+              <a:rPr lang="en-US" dirty="0"/>
+              <a:t>Reasons for using logistic Regression. Why is the linear kernel not as good (answer this question when you are presenting)</a:t>
+            </a:r>
+          </a:p>
+          <a:p>
+            <a:endParaRPr lang="en-US" dirty="0"/>
+          </a:p>
+          <a:p>
+            <a:r>
+              <a:rPr lang="en-US" dirty="0"/>
+              <a:t>ROC curve is the measurement for the classification problems at various threshold settings, ROC is a probability curve</a:t>
+            </a:r>
+          </a:p>
+          <a:p>
+            <a:endParaRPr lang="en-US" dirty="0"/>
+          </a:p>
+          <a:p>
+            <a:r>
+              <a:rPr lang="en-US" dirty="0"/>
+              <a:t>AUC represents the degree or measure of separability. It tells how much model can distinguish between the classes. Higher the AUC, better the model is at predicting 0s as 0s and 1s as 1s. </a:t>
+            </a:r>
+          </a:p>
+          <a:p>
+            <a:endParaRPr lang="en-US" dirty="0"/>
+          </a:p>
+          <a:p>
+            <a:endParaRPr lang="en-US" dirty="0"/>
+          </a:p>
+        </p:txBody>
+      </p:sp>
+      <p:sp>
+        <p:nvSpPr>
+          <p:cNvPr id="4" name="Slide Number Placeholder 3"/>
+          <p:cNvSpPr>
+            <a:spLocks noGrp="1"/>
+          </p:cNvSpPr>
+          <p:nvPr>
+            <p:ph type="sldNum" sz="quarter" idx="5"/>
+          </p:nvPr>
+        </p:nvSpPr>
+        <p:spPr/>
+        <p:txBody>
+          <a:bodyPr/>
+          <a:lstStyle/>
+          <a:p>
+            <a:fld id="{60C87FF9-C822-A140-B22B-C824FCF69242}" type="slidenum">
+              <a:rPr lang="en-US" smtClean="0"/>
+              <a:t>7</a:t>
+            </a:fld>
+            <a:endParaRPr lang="en-US"/>
+          </a:p>
+        </p:txBody>
+      </p:sp>
+    </p:spTree>
+    <p:extLst>
+      <p:ext uri="{BB962C8B-B14F-4D97-AF65-F5344CB8AC3E}">
+        <p14:creationId xmlns:p14="http://schemas.microsoft.com/office/powerpoint/2010/main" val="2819348221"/>
+      </p:ext>
+    </p:extLst>
+  </p:cSld>
+  <p:clrMapOvr>
+    <a:masterClrMapping/>
+  </p:clrMapOvr>
+</p:notes>
+</file>
+
+<file path=ppt/notesSlides/notesSlide6.xml><?xml version="1.0" encoding="utf-8"?>
+<p:notes xmlns:a="http://schemas.openxmlformats.org/drawingml/2006/main" xmlns:r="http://schemas.openxmlformats.org/officeDocument/2006/relationships" xmlns:p="http://schemas.openxmlformats.org/presentationml/2006/main">
+  <p:cSld>
+    <p:spTree>
+      <p:nvGrpSpPr>
+        <p:cNvPr id="1" name=""/>
+        <p:cNvGrpSpPr/>
+        <p:nvPr/>
+      </p:nvGrpSpPr>
+      <p:grpSpPr>
+        <a:xfrm>
+          <a:off x="0" y="0"/>
+          <a:ext cx="0" cy="0"/>
+          <a:chOff x="0" y="0"/>
+          <a:chExt cx="0" cy="0"/>
+        </a:xfrm>
+      </p:grpSpPr>
+      <p:sp>
+        <p:nvSpPr>
+          <p:cNvPr id="2" name="Slide Image Placeholder 1"/>
+          <p:cNvSpPr>
+            <a:spLocks noGrp="1" noRot="1" noChangeAspect="1"/>
+          </p:cNvSpPr>
+          <p:nvPr>
+            <p:ph type="sldImg"/>
+          </p:nvPr>
+        </p:nvSpPr>
+        <p:spPr/>
+      </p:sp>
+      <p:sp>
+        <p:nvSpPr>
+          <p:cNvPr id="3" name="Notes Placeholder 2"/>
+          <p:cNvSpPr>
+            <a:spLocks noGrp="1"/>
+          </p:cNvSpPr>
+          <p:nvPr>
+            <p:ph type="body" idx="1"/>
+          </p:nvPr>
+        </p:nvSpPr>
+        <p:spPr/>
+        <p:txBody>
+          <a:bodyPr/>
+          <a:lstStyle/>
+          <a:p>
+            <a:endParaRPr lang="en-US" dirty="0"/>
+          </a:p>
+        </p:txBody>
+      </p:sp>
+      <p:sp>
+        <p:nvSpPr>
+          <p:cNvPr id="4" name="Slide Number Placeholder 3"/>
+          <p:cNvSpPr>
+            <a:spLocks noGrp="1"/>
+          </p:cNvSpPr>
+          <p:nvPr>
+            <p:ph type="sldNum" sz="quarter" idx="5"/>
+          </p:nvPr>
+        </p:nvSpPr>
+        <p:spPr/>
+        <p:txBody>
+          <a:bodyPr/>
+          <a:lstStyle/>
+          <a:p>
+            <a:fld id="{60C87FF9-C822-A140-B22B-C824FCF69242}" type="slidenum">
+              <a:rPr lang="en-US" smtClean="0"/>
+              <a:t>8</a:t>
+            </a:fld>
+            <a:endParaRPr lang="en-US"/>
+          </a:p>
+        </p:txBody>
+      </p:sp>
+    </p:spTree>
+    <p:extLst>
+      <p:ext uri="{BB962C8B-B14F-4D97-AF65-F5344CB8AC3E}">
+        <p14:creationId xmlns:p14="http://schemas.microsoft.com/office/powerpoint/2010/main" val="3585699447"/>
+      </p:ext>
+    </p:extLst>
+  </p:cSld>
+  <p:clrMapOvr>
+    <a:masterClrMapping/>
+  </p:clrMapOvr>
+</p:notes>
+</file>
+
+<file path=ppt/notesSlides/notesSlide7.xml><?xml version="1.0" encoding="utf-8"?>
+<p:notes xmlns:a="http://schemas.openxmlformats.org/drawingml/2006/main" xmlns:r="http://schemas.openxmlformats.org/officeDocument/2006/relationships" xmlns:p="http://schemas.openxmlformats.org/presentationml/2006/main">
+  <p:cSld>
+    <p:spTree>
+      <p:nvGrpSpPr>
+        <p:cNvPr id="1" name=""/>
+        <p:cNvGrpSpPr/>
+        <p:nvPr/>
+      </p:nvGrpSpPr>
+      <p:grpSpPr>
+        <a:xfrm>
+          <a:off x="0" y="0"/>
+          <a:ext cx="0" cy="0"/>
+          <a:chOff x="0" y="0"/>
+          <a:chExt cx="0" cy="0"/>
+        </a:xfrm>
+      </p:grpSpPr>
+      <p:sp>
+        <p:nvSpPr>
+          <p:cNvPr id="2" name="Slide Image Placeholder 1"/>
+          <p:cNvSpPr>
+            <a:spLocks noGrp="1" noRot="1" noChangeAspect="1"/>
+          </p:cNvSpPr>
+          <p:nvPr>
+            <p:ph type="sldImg"/>
+          </p:nvPr>
+        </p:nvSpPr>
+        <p:spPr/>
+      </p:sp>
+      <p:sp>
+        <p:nvSpPr>
+          <p:cNvPr id="3" name="Notes Placeholder 2"/>
+          <p:cNvSpPr>
+            <a:spLocks noGrp="1"/>
+          </p:cNvSpPr>
+          <p:nvPr>
+            <p:ph type="body" idx="1"/>
+          </p:nvPr>
+        </p:nvSpPr>
+        <p:spPr/>
+        <p:txBody>
+          <a:bodyPr/>
+          <a:lstStyle/>
+          <a:p>
+            <a:r>
+              <a:rPr lang="en-US" dirty="0"/>
+              <a:t>Explain the benefit of Random Forest  and why its better then logistic Regression</a:t>
+            </a:r>
+          </a:p>
+        </p:txBody>
+      </p:sp>
+      <p:sp>
+        <p:nvSpPr>
+          <p:cNvPr id="4" name="Slide Number Placeholder 3"/>
+          <p:cNvSpPr>
+            <a:spLocks noGrp="1"/>
+          </p:cNvSpPr>
+          <p:nvPr>
+            <p:ph type="sldNum" sz="quarter" idx="5"/>
+          </p:nvPr>
+        </p:nvSpPr>
+        <p:spPr/>
+        <p:txBody>
+          <a:bodyPr/>
+          <a:lstStyle/>
+          <a:p>
+            <a:fld id="{60C87FF9-C822-A140-B22B-C824FCF69242}" type="slidenum">
+              <a:rPr lang="en-US" smtClean="0"/>
+              <a:t>9</a:t>
+            </a:fld>
+            <a:endParaRPr lang="en-US"/>
+          </a:p>
+        </p:txBody>
+      </p:sp>
+    </p:spTree>
+    <p:extLst>
+      <p:ext uri="{BB962C8B-B14F-4D97-AF65-F5344CB8AC3E}">
+        <p14:creationId xmlns:p14="http://schemas.microsoft.com/office/powerpoint/2010/main" val="3324665541"/>
+      </p:ext>
+    </p:extLst>
+  </p:cSld>
+  <p:clrMapOvr>
+    <a:masterClrMapping/>
+  </p:clrMapOvr>
+</p:notes>
+</file>
+
+<file path=ppt/notesSlides/notesSlide8.xml><?xml version="1.0" encoding="utf-8"?>
+<p:notes xmlns:a="http://schemas.openxmlformats.org/drawingml/2006/main" xmlns:r="http://schemas.openxmlformats.org/officeDocument/2006/relationships" xmlns:p="http://schemas.openxmlformats.org/presentationml/2006/main">
+  <p:cSld>
+    <p:spTree>
+      <p:nvGrpSpPr>
+        <p:cNvPr id="1" name=""/>
+        <p:cNvGrpSpPr/>
+        <p:nvPr/>
+      </p:nvGrpSpPr>
+      <p:grpSpPr>
+        <a:xfrm>
+          <a:off x="0" y="0"/>
+          <a:ext cx="0" cy="0"/>
+          <a:chOff x="0" y="0"/>
+          <a:chExt cx="0" cy="0"/>
+        </a:xfrm>
+      </p:grpSpPr>
+      <p:sp>
+        <p:nvSpPr>
+          <p:cNvPr id="2" name="Slide Image Placeholder 1"/>
+          <p:cNvSpPr>
+            <a:spLocks noGrp="1" noRot="1" noChangeAspect="1"/>
+          </p:cNvSpPr>
+          <p:nvPr>
+            <p:ph type="sldImg"/>
+          </p:nvPr>
+        </p:nvSpPr>
+        <p:spPr/>
+      </p:sp>
+      <p:sp>
+        <p:nvSpPr>
+          <p:cNvPr id="3" name="Notes Placeholder 2"/>
+          <p:cNvSpPr>
+            <a:spLocks noGrp="1"/>
+          </p:cNvSpPr>
+          <p:nvPr>
+            <p:ph type="body" idx="1"/>
+          </p:nvPr>
+        </p:nvSpPr>
+        <p:spPr/>
+        <p:txBody>
+          <a:bodyPr/>
+          <a:lstStyle/>
+          <a:p>
+            <a:r>
+              <a:rPr lang="en-US" dirty="0"/>
+              <a:t>Explain benefits of MLP and why it could be better</a:t>
+            </a:r>
+          </a:p>
+        </p:txBody>
+      </p:sp>
+      <p:sp>
+        <p:nvSpPr>
+          <p:cNvPr id="4" name="Slide Number Placeholder 3"/>
+          <p:cNvSpPr>
+            <a:spLocks noGrp="1"/>
+          </p:cNvSpPr>
+          <p:nvPr>
+            <p:ph type="sldNum" sz="quarter" idx="5"/>
+          </p:nvPr>
+        </p:nvSpPr>
+        <p:spPr/>
+        <p:txBody>
+          <a:bodyPr/>
+          <a:lstStyle/>
+          <a:p>
+            <a:fld id="{60C87FF9-C822-A140-B22B-C824FCF69242}" type="slidenum">
+              <a:rPr lang="en-US" smtClean="0"/>
+              <a:t>11</a:t>
+            </a:fld>
+            <a:endParaRPr lang="en-US"/>
+          </a:p>
+        </p:txBody>
+      </p:sp>
+    </p:spTree>
+    <p:extLst>
+      <p:ext uri="{BB962C8B-B14F-4D97-AF65-F5344CB8AC3E}">
+        <p14:creationId xmlns:p14="http://schemas.microsoft.com/office/powerpoint/2010/main" val="170935215"/>
+      </p:ext>
+    </p:extLst>
+  </p:cSld>
+  <p:clrMapOvr>
+    <a:masterClrMapping/>
+  </p:clrMapOvr>
+</p:notes>
+</file>
+
+<file path=ppt/notesSlides/notesSlide9.xml><?xml version="1.0" encoding="utf-8"?>
+<p:notes xmlns:a="http://schemas.openxmlformats.org/drawingml/2006/main" xmlns:r="http://schemas.openxmlformats.org/officeDocument/2006/relationships" xmlns:p="http://schemas.openxmlformats.org/presentationml/2006/main">
+  <p:cSld>
+    <p:spTree>
+      <p:nvGrpSpPr>
+        <p:cNvPr id="1" name=""/>
+        <p:cNvGrpSpPr/>
+        <p:nvPr/>
+      </p:nvGrpSpPr>
+      <p:grpSpPr>
+        <a:xfrm>
+          <a:off x="0" y="0"/>
+          <a:ext cx="0" cy="0"/>
+          <a:chOff x="0" y="0"/>
+          <a:chExt cx="0" cy="0"/>
+        </a:xfrm>
+      </p:grpSpPr>
+      <p:sp>
+        <p:nvSpPr>
+          <p:cNvPr id="2" name="Slide Image Placeholder 1"/>
+          <p:cNvSpPr>
+            <a:spLocks noGrp="1" noRot="1" noChangeAspect="1"/>
+          </p:cNvSpPr>
+          <p:nvPr>
+            <p:ph type="sldImg"/>
+          </p:nvPr>
+        </p:nvSpPr>
+        <p:spPr/>
+      </p:sp>
+      <p:sp>
+        <p:nvSpPr>
+          <p:cNvPr id="3" name="Notes Placeholder 2"/>
+          <p:cNvSpPr>
+            <a:spLocks noGrp="1"/>
+          </p:cNvSpPr>
+          <p:nvPr>
+            <p:ph type="body" idx="1"/>
+          </p:nvPr>
+        </p:nvSpPr>
+        <p:spPr/>
+        <p:txBody>
+          <a:bodyPr/>
+          <a:lstStyle/>
+          <a:p>
+            <a:endParaRPr lang="en-US" dirty="0"/>
+          </a:p>
+        </p:txBody>
+      </p:sp>
+      <p:sp>
+        <p:nvSpPr>
+          <p:cNvPr id="4" name="Slide Number Placeholder 3"/>
+          <p:cNvSpPr>
+            <a:spLocks noGrp="1"/>
+          </p:cNvSpPr>
+          <p:nvPr>
+            <p:ph type="sldNum" sz="quarter" idx="5"/>
+          </p:nvPr>
+        </p:nvSpPr>
+        <p:spPr/>
+        <p:txBody>
+          <a:bodyPr/>
+          <a:lstStyle/>
+          <a:p>
+            <a:fld id="{60C87FF9-C822-A140-B22B-C824FCF69242}" type="slidenum">
+              <a:rPr lang="en-US" smtClean="0"/>
+              <a:t>13</a:t>
             </a:fld>
             <a:endParaRPr lang="en-US"/>
           </a:p>
@@ -4590,6 +5139,433 @@
           <p:cNvPr id="2" name="Title 1">
             <a:extLst>
               <a:ext uri="{FF2B5EF4-FFF2-40B4-BE49-F238E27FC236}">
+                <a16:creationId xmlns:a16="http://schemas.microsoft.com/office/drawing/2014/main" id="{A17FDF08-FB8E-4841-9599-ABFCDD0371E8}"/>
+              </a:ext>
+            </a:extLst>
+          </p:cNvPr>
+          <p:cNvSpPr>
+            <a:spLocks noGrp="1"/>
+          </p:cNvSpPr>
+          <p:nvPr>
+            <p:ph type="title"/>
+          </p:nvPr>
+        </p:nvSpPr>
+        <p:spPr/>
+        <p:txBody>
+          <a:bodyPr/>
+          <a:lstStyle/>
+          <a:p>
+            <a:r>
+              <a:rPr lang="en-US" dirty="0"/>
+              <a:t>Results From Random Forest Classifier</a:t>
+            </a:r>
+          </a:p>
+        </p:txBody>
+      </p:sp>
+      <p:pic>
+        <p:nvPicPr>
+          <p:cNvPr id="5" name="Content Placeholder 4">
+            <a:extLst>
+              <a:ext uri="{FF2B5EF4-FFF2-40B4-BE49-F238E27FC236}">
+                <a16:creationId xmlns:a16="http://schemas.microsoft.com/office/drawing/2014/main" id="{67EE8019-9B73-BD47-BDF1-DC5AE45AB748}"/>
+              </a:ext>
+            </a:extLst>
+          </p:cNvPr>
+          <p:cNvPicPr>
+            <a:picLocks noGrp="1" noChangeAspect="1"/>
+          </p:cNvPicPr>
+          <p:nvPr>
+            <p:ph idx="1"/>
+          </p:nvPr>
+        </p:nvPicPr>
+        <p:blipFill>
+          <a:blip r:embed="rId2"/>
+          <a:stretch>
+            <a:fillRect/>
+          </a:stretch>
+        </p:blipFill>
+        <p:spPr>
+          <a:xfrm>
+            <a:off x="3386156" y="2171700"/>
+            <a:ext cx="5572087" cy="3871134"/>
+          </a:xfrm>
+        </p:spPr>
+      </p:pic>
+    </p:spTree>
+    <p:extLst>
+      <p:ext uri="{BB962C8B-B14F-4D97-AF65-F5344CB8AC3E}">
+        <p14:creationId xmlns:p14="http://schemas.microsoft.com/office/powerpoint/2010/main" val="4054102253"/>
+      </p:ext>
+    </p:extLst>
+  </p:cSld>
+  <p:clrMapOvr>
+    <a:masterClrMapping/>
+  </p:clrMapOvr>
+</p:sld>
+</file>
+
+<file path=ppt/slides/slide11.xml><?xml version="1.0" encoding="utf-8"?>
+<p:sld xmlns:a="http://schemas.openxmlformats.org/drawingml/2006/main" xmlns:r="http://schemas.openxmlformats.org/officeDocument/2006/relationships" xmlns:p="http://schemas.openxmlformats.org/presentationml/2006/main">
+  <p:cSld>
+    <p:spTree>
+      <p:nvGrpSpPr>
+        <p:cNvPr id="1" name=""/>
+        <p:cNvGrpSpPr/>
+        <p:nvPr/>
+      </p:nvGrpSpPr>
+      <p:grpSpPr>
+        <a:xfrm>
+          <a:off x="0" y="0"/>
+          <a:ext cx="0" cy="0"/>
+          <a:chOff x="0" y="0"/>
+          <a:chExt cx="0" cy="0"/>
+        </a:xfrm>
+      </p:grpSpPr>
+      <p:sp>
+        <p:nvSpPr>
+          <p:cNvPr id="2" name="Title 1">
+            <a:extLst>
+              <a:ext uri="{FF2B5EF4-FFF2-40B4-BE49-F238E27FC236}">
+                <a16:creationId xmlns:a16="http://schemas.microsoft.com/office/drawing/2014/main" id="{C5022CC8-2D7E-E642-B45C-1FC6F393B542}"/>
+              </a:ext>
+            </a:extLst>
+          </p:cNvPr>
+          <p:cNvSpPr>
+            <a:spLocks noGrp="1"/>
+          </p:cNvSpPr>
+          <p:nvPr>
+            <p:ph type="title"/>
+          </p:nvPr>
+        </p:nvSpPr>
+        <p:spPr/>
+        <p:txBody>
+          <a:bodyPr/>
+          <a:lstStyle/>
+          <a:p>
+            <a:pPr algn="ctr"/>
+            <a:r>
+              <a:rPr lang="en-US" dirty="0"/>
+              <a:t>Results From MLP</a:t>
+            </a:r>
+          </a:p>
+        </p:txBody>
+      </p:sp>
+      <p:pic>
+        <p:nvPicPr>
+          <p:cNvPr id="5" name="Content Placeholder 4" descr="Chart, line chart&#10;&#10;Description automatically generated">
+            <a:extLst>
+              <a:ext uri="{FF2B5EF4-FFF2-40B4-BE49-F238E27FC236}">
+                <a16:creationId xmlns:a16="http://schemas.microsoft.com/office/drawing/2014/main" id="{72B3EEFD-73CF-744D-B2A1-510ABF4DB480}"/>
+              </a:ext>
+            </a:extLst>
+          </p:cNvPr>
+          <p:cNvPicPr>
+            <a:picLocks noGrp="1" noChangeAspect="1"/>
+          </p:cNvPicPr>
+          <p:nvPr>
+            <p:ph idx="1"/>
+          </p:nvPr>
+        </p:nvPicPr>
+        <p:blipFill>
+          <a:blip r:embed="rId3"/>
+          <a:stretch>
+            <a:fillRect/>
+          </a:stretch>
+        </p:blipFill>
+        <p:spPr>
+          <a:xfrm>
+            <a:off x="1046108" y="2171700"/>
+            <a:ext cx="4446651" cy="2858562"/>
+          </a:xfrm>
+        </p:spPr>
+      </p:pic>
+      <p:pic>
+        <p:nvPicPr>
+          <p:cNvPr id="7" name="Picture 6" descr="Chart, line chart&#10;&#10;Description automatically generated">
+            <a:extLst>
+              <a:ext uri="{FF2B5EF4-FFF2-40B4-BE49-F238E27FC236}">
+                <a16:creationId xmlns:a16="http://schemas.microsoft.com/office/drawing/2014/main" id="{5DA5E263-338C-B04D-9A52-160E73295EF3}"/>
+              </a:ext>
+            </a:extLst>
+          </p:cNvPr>
+          <p:cNvPicPr>
+            <a:picLocks noChangeAspect="1"/>
+          </p:cNvPicPr>
+          <p:nvPr/>
+        </p:nvPicPr>
+        <p:blipFill>
+          <a:blip r:embed="rId4"/>
+          <a:stretch>
+            <a:fillRect/>
+          </a:stretch>
+        </p:blipFill>
+        <p:spPr>
+          <a:xfrm>
+            <a:off x="6699243" y="2202238"/>
+            <a:ext cx="4954056" cy="2828024"/>
+          </a:xfrm>
+          <a:prstGeom prst="rect">
+            <a:avLst/>
+          </a:prstGeom>
+        </p:spPr>
+      </p:pic>
+      <p:sp>
+        <p:nvSpPr>
+          <p:cNvPr id="8" name="TextBox 7">
+            <a:extLst>
+              <a:ext uri="{FF2B5EF4-FFF2-40B4-BE49-F238E27FC236}">
+                <a16:creationId xmlns:a16="http://schemas.microsoft.com/office/drawing/2014/main" id="{86637EE5-3E37-BD48-8540-5C92C9663745}"/>
+              </a:ext>
+            </a:extLst>
+          </p:cNvPr>
+          <p:cNvSpPr txBox="1"/>
+          <p:nvPr/>
+        </p:nvSpPr>
+        <p:spPr>
+          <a:xfrm>
+            <a:off x="904167" y="5280019"/>
+            <a:ext cx="4945790" cy="307777"/>
+          </a:xfrm>
+          <a:prstGeom prst="rect">
+            <a:avLst/>
+          </a:prstGeom>
+          <a:noFill/>
+        </p:spPr>
+        <p:txBody>
+          <a:bodyPr wrap="square" rtlCol="0">
+            <a:spAutoFit/>
+          </a:bodyPr>
+          <a:lstStyle/>
+          <a:p>
+            <a:r>
+              <a:rPr lang="en-US" sz="1400" dirty="0"/>
+              <a:t>Activation Function=‘logistic’, solver=‘</a:t>
+            </a:r>
+            <a:r>
+              <a:rPr lang="en-US" sz="1400" dirty="0" err="1"/>
+              <a:t>adam</a:t>
+            </a:r>
+            <a:r>
+              <a:rPr lang="en-US" sz="1400" dirty="0"/>
+              <a:t>’,  alpha=0.0001</a:t>
+            </a:r>
+          </a:p>
+        </p:txBody>
+      </p:sp>
+      <p:sp>
+        <p:nvSpPr>
+          <p:cNvPr id="9" name="TextBox 8">
+            <a:extLst>
+              <a:ext uri="{FF2B5EF4-FFF2-40B4-BE49-F238E27FC236}">
+                <a16:creationId xmlns:a16="http://schemas.microsoft.com/office/drawing/2014/main" id="{ECBDE4B0-0B1C-D345-A487-28CF3A02315E}"/>
+              </a:ext>
+            </a:extLst>
+          </p:cNvPr>
+          <p:cNvSpPr txBox="1"/>
+          <p:nvPr/>
+        </p:nvSpPr>
+        <p:spPr>
+          <a:xfrm>
+            <a:off x="7362951" y="5126131"/>
+            <a:ext cx="4290348" cy="307777"/>
+          </a:xfrm>
+          <a:prstGeom prst="rect">
+            <a:avLst/>
+          </a:prstGeom>
+          <a:noFill/>
+        </p:spPr>
+        <p:txBody>
+          <a:bodyPr wrap="square" rtlCol="0">
+            <a:spAutoFit/>
+          </a:bodyPr>
+          <a:lstStyle/>
+          <a:p>
+            <a:r>
+              <a:rPr lang="en-US" sz="1400" dirty="0"/>
+              <a:t>Activation Function=‘</a:t>
+            </a:r>
+            <a:r>
+              <a:rPr lang="en-US" sz="1400" dirty="0" err="1"/>
+              <a:t>relu</a:t>
+            </a:r>
+            <a:r>
+              <a:rPr lang="en-US" sz="1400" dirty="0"/>
+              <a:t>’, solver=‘</a:t>
+            </a:r>
+            <a:r>
+              <a:rPr lang="en-US" sz="1400" dirty="0" err="1"/>
+              <a:t>adam</a:t>
+            </a:r>
+            <a:r>
+              <a:rPr lang="en-US" sz="1400" dirty="0"/>
+              <a:t>’,  alpha=0.0001</a:t>
+            </a:r>
+          </a:p>
+        </p:txBody>
+      </p:sp>
+    </p:spTree>
+    <p:extLst>
+      <p:ext uri="{BB962C8B-B14F-4D97-AF65-F5344CB8AC3E}">
+        <p14:creationId xmlns:p14="http://schemas.microsoft.com/office/powerpoint/2010/main" val="2345433897"/>
+      </p:ext>
+    </p:extLst>
+  </p:cSld>
+  <p:clrMapOvr>
+    <a:masterClrMapping/>
+  </p:clrMapOvr>
+</p:sld>
+</file>
+
+<file path=ppt/slides/slide12.xml><?xml version="1.0" encoding="utf-8"?>
+<p:sld xmlns:a="http://schemas.openxmlformats.org/drawingml/2006/main" xmlns:r="http://schemas.openxmlformats.org/officeDocument/2006/relationships" xmlns:p="http://schemas.openxmlformats.org/presentationml/2006/main">
+  <p:cSld>
+    <p:spTree>
+      <p:nvGrpSpPr>
+        <p:cNvPr id="1" name=""/>
+        <p:cNvGrpSpPr/>
+        <p:nvPr/>
+      </p:nvGrpSpPr>
+      <p:grpSpPr>
+        <a:xfrm>
+          <a:off x="0" y="0"/>
+          <a:ext cx="0" cy="0"/>
+          <a:chOff x="0" y="0"/>
+          <a:chExt cx="0" cy="0"/>
+        </a:xfrm>
+      </p:grpSpPr>
+      <p:sp>
+        <p:nvSpPr>
+          <p:cNvPr id="2" name="Title 1">
+            <a:extLst>
+              <a:ext uri="{FF2B5EF4-FFF2-40B4-BE49-F238E27FC236}">
+                <a16:creationId xmlns:a16="http://schemas.microsoft.com/office/drawing/2014/main" id="{FEFAFC62-782C-D448-A85B-EFDBDBE18A7B}"/>
+              </a:ext>
+            </a:extLst>
+          </p:cNvPr>
+          <p:cNvSpPr>
+            <a:spLocks noGrp="1"/>
+          </p:cNvSpPr>
+          <p:nvPr>
+            <p:ph type="title"/>
+          </p:nvPr>
+        </p:nvSpPr>
+        <p:spPr>
+          <a:xfrm>
+            <a:off x="1232053" y="687636"/>
+            <a:ext cx="9727894" cy="834528"/>
+          </a:xfrm>
+        </p:spPr>
+        <p:txBody>
+          <a:bodyPr/>
+          <a:lstStyle/>
+          <a:p>
+            <a:pPr algn="ctr"/>
+            <a:r>
+              <a:rPr lang="en-US" dirty="0"/>
+              <a:t>Results From MLP</a:t>
+            </a:r>
+          </a:p>
+        </p:txBody>
+      </p:sp>
+      <p:pic>
+        <p:nvPicPr>
+          <p:cNvPr id="5" name="Content Placeholder 4" descr="Chart&#10;&#10;Description automatically generated">
+            <a:extLst>
+              <a:ext uri="{FF2B5EF4-FFF2-40B4-BE49-F238E27FC236}">
+                <a16:creationId xmlns:a16="http://schemas.microsoft.com/office/drawing/2014/main" id="{F843EB9B-D7C1-0D4C-9C5B-6769614293F4}"/>
+              </a:ext>
+            </a:extLst>
+          </p:cNvPr>
+          <p:cNvPicPr>
+            <a:picLocks noGrp="1" noChangeAspect="1"/>
+          </p:cNvPicPr>
+          <p:nvPr>
+            <p:ph idx="1"/>
+          </p:nvPr>
+        </p:nvPicPr>
+        <p:blipFill>
+          <a:blip r:embed="rId2"/>
+          <a:stretch>
+            <a:fillRect/>
+          </a:stretch>
+        </p:blipFill>
+        <p:spPr>
+          <a:xfrm>
+            <a:off x="3447668" y="1878510"/>
+            <a:ext cx="5707552" cy="3455949"/>
+          </a:xfrm>
+        </p:spPr>
+      </p:pic>
+      <p:sp>
+        <p:nvSpPr>
+          <p:cNvPr id="6" name="TextBox 5">
+            <a:extLst>
+              <a:ext uri="{FF2B5EF4-FFF2-40B4-BE49-F238E27FC236}">
+                <a16:creationId xmlns:a16="http://schemas.microsoft.com/office/drawing/2014/main" id="{9D404464-D406-2B42-85CD-2408F7E6AE00}"/>
+              </a:ext>
+            </a:extLst>
+          </p:cNvPr>
+          <p:cNvSpPr txBox="1"/>
+          <p:nvPr/>
+        </p:nvSpPr>
+        <p:spPr>
+          <a:xfrm>
+            <a:off x="4373085" y="5506139"/>
+            <a:ext cx="5817518" cy="369332"/>
+          </a:xfrm>
+          <a:prstGeom prst="rect">
+            <a:avLst/>
+          </a:prstGeom>
+          <a:noFill/>
+        </p:spPr>
+        <p:txBody>
+          <a:bodyPr wrap="square" rtlCol="0">
+            <a:spAutoFit/>
+          </a:bodyPr>
+          <a:lstStyle/>
+          <a:p>
+            <a:r>
+              <a:rPr lang="en-US" dirty="0"/>
+              <a:t>AUC Score: 0.7835695006747638</a:t>
+            </a:r>
+          </a:p>
+        </p:txBody>
+      </p:sp>
+    </p:spTree>
+    <p:extLst>
+      <p:ext uri="{BB962C8B-B14F-4D97-AF65-F5344CB8AC3E}">
+        <p14:creationId xmlns:p14="http://schemas.microsoft.com/office/powerpoint/2010/main" val="4140738969"/>
+      </p:ext>
+    </p:extLst>
+  </p:cSld>
+  <p:clrMapOvr>
+    <a:masterClrMapping/>
+  </p:clrMapOvr>
+</p:sld>
+</file>
+
+<file path=ppt/slides/slide13.xml><?xml version="1.0" encoding="utf-8"?>
+<p:sld xmlns:a="http://schemas.openxmlformats.org/drawingml/2006/main" xmlns:r="http://schemas.openxmlformats.org/officeDocument/2006/relationships" xmlns:p="http://schemas.openxmlformats.org/presentationml/2006/main">
+  <p:cSld>
+    <p:spTree>
+      <p:nvGrpSpPr>
+        <p:cNvPr id="1" name=""/>
+        <p:cNvGrpSpPr/>
+        <p:nvPr/>
+      </p:nvGrpSpPr>
+      <p:grpSpPr>
+        <a:xfrm>
+          <a:off x="0" y="0"/>
+          <a:ext cx="0" cy="0"/>
+          <a:chOff x="0" y="0"/>
+          <a:chExt cx="0" cy="0"/>
+        </a:xfrm>
+      </p:grpSpPr>
+      <p:sp>
+        <p:nvSpPr>
+          <p:cNvPr id="2" name="Title 1">
+            <a:extLst>
+              <a:ext uri="{FF2B5EF4-FFF2-40B4-BE49-F238E27FC236}">
                 <a16:creationId xmlns:a16="http://schemas.microsoft.com/office/drawing/2014/main" id="{2E57083B-0B73-9647-B6BE-65117DDDB00D}"/>
               </a:ext>
             </a:extLst>
@@ -4639,7 +5615,7 @@
           <a:p>
             <a:r>
               <a:rPr lang="en-US" dirty="0"/>
-              <a:t>Reading and summarizing different paper for most of the term</a:t>
+              <a:t>Reading and summarizing different papers at the beginning of the term</a:t>
             </a:r>
           </a:p>
           <a:p>
@@ -4651,7 +5627,7 @@
           <a:p>
             <a:r>
               <a:rPr lang="en-US" dirty="0"/>
-              <a:t>Last few weeks was trying to understand how to implement the author initial paper.</a:t>
+              <a:t>Last few weeks I was trying to implement and organize the database that was provided within the paper</a:t>
             </a:r>
           </a:p>
         </p:txBody>
@@ -5126,7 +6102,43 @@
           <a:p>
             <a:r>
               <a:rPr lang="en-US" dirty="0"/>
-              <a:t>Utilization of k-</a:t>
+              <a:t>Utilization of </a:t>
+            </a:r>
+            <a:r>
+              <a:rPr lang="en-US" dirty="0" err="1"/>
+              <a:t>sklearn</a:t>
+            </a:r>
+            <a:r>
+              <a:rPr lang="en-US" dirty="0"/>
+              <a:t> models with the </a:t>
+            </a:r>
+            <a:r>
+              <a:rPr lang="en-US" dirty="0" err="1"/>
+              <a:t>kmer</a:t>
+            </a:r>
+            <a:r>
+              <a:rPr lang="en-US" dirty="0"/>
+              <a:t> approach</a:t>
+            </a:r>
+          </a:p>
+          <a:p>
+            <a:r>
+              <a:rPr lang="en-US" dirty="0"/>
+              <a:t>Using </a:t>
+            </a:r>
+            <a:r>
+              <a:rPr lang="en-US" dirty="0" err="1"/>
+              <a:t>kmers</a:t>
+            </a:r>
+            <a:r>
+              <a:rPr lang="en-US" dirty="0"/>
+              <a:t> to see what best value of K gives us the best accuracy</a:t>
+            </a:r>
+          </a:p>
+          <a:p>
+            <a:r>
+              <a:rPr lang="en-US" dirty="0"/>
+              <a:t>These k-</a:t>
             </a:r>
             <a:r>
               <a:rPr lang="en-US" dirty="0" err="1"/>
@@ -5134,40 +6146,7 @@
             </a:r>
             <a:r>
               <a:rPr lang="en-US" dirty="0"/>
-              <a:t> using models within </a:t>
-            </a:r>
-            <a:r>
-              <a:rPr lang="en-US" dirty="0" err="1"/>
-              <a:t>sklearn</a:t>
-            </a:r>
-            <a:endParaRPr lang="en-US" dirty="0"/>
-          </a:p>
-          <a:p>
-            <a:r>
-              <a:rPr lang="en-US" dirty="0"/>
-              <a:t>In this case we are using k-</a:t>
-            </a:r>
-            <a:r>
-              <a:rPr lang="en-US" dirty="0" err="1"/>
-              <a:t>mers</a:t>
-            </a:r>
-            <a:r>
-              <a:rPr lang="en-US" dirty="0"/>
-              <a:t> testing the length of different k</a:t>
-            </a:r>
-          </a:p>
-          <a:p>
-            <a:r>
-              <a:rPr lang="en-US" dirty="0"/>
-              <a:t>These k-</a:t>
-            </a:r>
-            <a:r>
-              <a:rPr lang="en-US" dirty="0" err="1"/>
-              <a:t>mers</a:t>
-            </a:r>
-            <a:r>
-              <a:rPr lang="en-US" dirty="0"/>
-              <a:t> are more so describing binding sites and we can cover a discrete space of all possible DNA molecules of length k. </a:t>
+              <a:t> are more so describing binding sites and we can cover a discrete space of all possible DNA molecules of length k</a:t>
             </a:r>
           </a:p>
           <a:p>
@@ -5350,28 +6329,143 @@
           </a:p>
         </p:txBody>
       </p:sp>
-      <p:sp>
-        <p:nvSpPr>
-          <p:cNvPr id="3" name="Content Placeholder 2">
+      <p:pic>
+        <p:nvPicPr>
+          <p:cNvPr id="4" name="Content Placeholder 4">
             <a:extLst>
               <a:ext uri="{FF2B5EF4-FFF2-40B4-BE49-F238E27FC236}">
-                <a16:creationId xmlns:a16="http://schemas.microsoft.com/office/drawing/2014/main" id="{A7B739C7-04F1-3A48-B3FB-2CC7F0586B31}"/>
+                <a16:creationId xmlns:a16="http://schemas.microsoft.com/office/drawing/2014/main" id="{041613C0-45D1-6C4B-8C7A-52F0B735CB4F}"/>
               </a:ext>
             </a:extLst>
           </p:cNvPr>
-          <p:cNvSpPr>
-            <a:spLocks noGrp="1"/>
-          </p:cNvSpPr>
+          <p:cNvPicPr>
+            <a:picLocks noGrp="1" noChangeAspect="1"/>
+          </p:cNvPicPr>
           <p:nvPr>
             <p:ph idx="1"/>
           </p:nvPr>
-        </p:nvSpPr>
-        <p:spPr/>
-        <p:txBody>
-          <a:bodyPr/>
-          <a:lstStyle/>
-          <a:p>
-            <a:endParaRPr lang="en-US" dirty="0"/>
+        </p:nvPicPr>
+        <p:blipFill>
+          <a:blip r:embed="rId3"/>
+          <a:stretch>
+            <a:fillRect/>
+          </a:stretch>
+        </p:blipFill>
+        <p:spPr>
+          <a:xfrm>
+            <a:off x="983942" y="1849657"/>
+            <a:ext cx="4368643" cy="2885260"/>
+          </a:xfrm>
+        </p:spPr>
+      </p:pic>
+      <p:sp>
+        <p:nvSpPr>
+          <p:cNvPr id="6" name="Rectangle 5">
+            <a:extLst>
+              <a:ext uri="{FF2B5EF4-FFF2-40B4-BE49-F238E27FC236}">
+                <a16:creationId xmlns:a16="http://schemas.microsoft.com/office/drawing/2014/main" id="{8E2AF9CE-6A05-F543-A6CE-0186DA2C3B91}"/>
+              </a:ext>
+            </a:extLst>
+          </p:cNvPr>
+          <p:cNvSpPr/>
+          <p:nvPr/>
+        </p:nvSpPr>
+        <p:spPr>
+          <a:xfrm>
+            <a:off x="2031380" y="5987534"/>
+            <a:ext cx="8281639" cy="369332"/>
+          </a:xfrm>
+          <a:prstGeom prst="rect">
+            <a:avLst/>
+          </a:prstGeom>
+        </p:spPr>
+        <p:txBody>
+          <a:bodyPr wrap="square">
+            <a:spAutoFit/>
+          </a:bodyPr>
+          <a:lstStyle/>
+          <a:p>
+            <a:r>
+              <a:rPr lang="en-US" dirty="0" err="1"/>
+              <a:t>Kmer</a:t>
+            </a:r>
+            <a:r>
+              <a:rPr lang="en-US" dirty="0"/>
+              <a:t> Combinations : </a:t>
+            </a:r>
+            <a:r>
+              <a:rPr lang="en-US" dirty="0" err="1"/>
+              <a:t>Dna</a:t>
+            </a:r>
+            <a:r>
+              <a:rPr lang="en-US" dirty="0"/>
+              <a:t>: 1, Zinc:1, Dna:1 Zinc:2, Dna:1 Zinc:3…..DNA:15 Zinc:15</a:t>
+            </a:r>
+          </a:p>
+        </p:txBody>
+      </p:sp>
+      <p:pic>
+        <p:nvPicPr>
+          <p:cNvPr id="8" name="Picture 7" descr="Chart, scatter chart&#10;&#10;Description automatically generated">
+            <a:extLst>
+              <a:ext uri="{FF2B5EF4-FFF2-40B4-BE49-F238E27FC236}">
+                <a16:creationId xmlns:a16="http://schemas.microsoft.com/office/drawing/2014/main" id="{FF319083-DBFA-F84E-8713-6C46D12D0B47}"/>
+              </a:ext>
+            </a:extLst>
+          </p:cNvPr>
+          <p:cNvPicPr>
+            <a:picLocks noChangeAspect="1"/>
+          </p:cNvPicPr>
+          <p:nvPr/>
+        </p:nvPicPr>
+        <p:blipFill>
+          <a:blip r:embed="rId4"/>
+          <a:stretch>
+            <a:fillRect/>
+          </a:stretch>
+        </p:blipFill>
+        <p:spPr>
+          <a:xfrm>
+            <a:off x="6834303" y="1792439"/>
+            <a:ext cx="4526155" cy="2999127"/>
+          </a:xfrm>
+          <a:prstGeom prst="rect">
+            <a:avLst/>
+          </a:prstGeom>
+        </p:spPr>
+      </p:pic>
+      <p:sp>
+        <p:nvSpPr>
+          <p:cNvPr id="9" name="TextBox 8">
+            <a:extLst>
+              <a:ext uri="{FF2B5EF4-FFF2-40B4-BE49-F238E27FC236}">
+                <a16:creationId xmlns:a16="http://schemas.microsoft.com/office/drawing/2014/main" id="{7D5D5BFC-7763-6044-851F-EA8A3C74B5B1}"/>
+              </a:ext>
+            </a:extLst>
+          </p:cNvPr>
+          <p:cNvSpPr txBox="1"/>
+          <p:nvPr/>
+        </p:nvSpPr>
+        <p:spPr>
+          <a:xfrm>
+            <a:off x="7325812" y="4835552"/>
+            <a:ext cx="4238530" cy="369332"/>
+          </a:xfrm>
+          <a:prstGeom prst="rect">
+            <a:avLst/>
+          </a:prstGeom>
+          <a:noFill/>
+        </p:spPr>
+        <p:txBody>
+          <a:bodyPr wrap="square" rtlCol="0">
+            <a:spAutoFit/>
+          </a:bodyPr>
+          <a:lstStyle/>
+          <a:p>
+            <a:r>
+              <a:rPr lang="en-US" dirty="0"/>
+              <a:t>AUC Score: 0.6373819163292846</a:t>
+            </a:r>
           </a:p>
         </p:txBody>
       </p:sp>
@@ -5410,7 +6504,7 @@
           <p:cNvPr id="2" name="Title 1">
             <a:extLst>
               <a:ext uri="{FF2B5EF4-FFF2-40B4-BE49-F238E27FC236}">
-                <a16:creationId xmlns:a16="http://schemas.microsoft.com/office/drawing/2014/main" id="{77889F0C-B838-9447-919F-A7F85F38BCE9}"/>
+                <a16:creationId xmlns:a16="http://schemas.microsoft.com/office/drawing/2014/main" id="{919067D3-BDB2-0048-BA94-BCC4C57CBAE8}"/>
               </a:ext>
             </a:extLst>
           </p:cNvPr>
@@ -5423,48 +6517,50 @@
         </p:nvSpPr>
         <p:spPr/>
         <p:txBody>
-          <a:bodyPr>
-            <a:normAutofit/>
-          </a:bodyPr>
+          <a:bodyPr/>
           <a:lstStyle/>
           <a:p>
             <a:pPr algn="ctr"/>
             <a:r>
               <a:rPr lang="en-US" dirty="0"/>
-              <a:t>Results From Random Forrest Classifier </a:t>
-            </a:r>
-          </a:p>
-        </p:txBody>
-      </p:sp>
-      <p:sp>
-        <p:nvSpPr>
-          <p:cNvPr id="3" name="Content Placeholder 2">
+              <a:t>Results From Logistic Regression</a:t>
+            </a:r>
+          </a:p>
+        </p:txBody>
+      </p:sp>
+      <p:pic>
+        <p:nvPicPr>
+          <p:cNvPr id="5" name="Content Placeholder 4" descr="Chart, treemap chart&#10;&#10;Description automatically generated">
             <a:extLst>
               <a:ext uri="{FF2B5EF4-FFF2-40B4-BE49-F238E27FC236}">
-                <a16:creationId xmlns:a16="http://schemas.microsoft.com/office/drawing/2014/main" id="{5BAFEB81-A87C-464F-BD2A-F015B376F2EA}"/>
+                <a16:creationId xmlns:a16="http://schemas.microsoft.com/office/drawing/2014/main" id="{D738EDAA-B6AD-1840-8759-DD8B3FBEDECF}"/>
               </a:ext>
             </a:extLst>
           </p:cNvPr>
-          <p:cNvSpPr>
-            <a:spLocks noGrp="1"/>
-          </p:cNvSpPr>
+          <p:cNvPicPr>
+            <a:picLocks noGrp="1" noChangeAspect="1"/>
+          </p:cNvPicPr>
           <p:nvPr>
             <p:ph idx="1"/>
           </p:nvPr>
-        </p:nvSpPr>
-        <p:spPr/>
-        <p:txBody>
-          <a:bodyPr/>
-          <a:lstStyle/>
-          <a:p>
-            <a:endParaRPr lang="en-US" dirty="0"/>
-          </a:p>
-        </p:txBody>
-      </p:sp>
+        </p:nvPicPr>
+        <p:blipFill>
+          <a:blip r:embed="rId3"/>
+          <a:stretch>
+            <a:fillRect/>
+          </a:stretch>
+        </p:blipFill>
+        <p:spPr>
+          <a:xfrm>
+            <a:off x="4164909" y="1871336"/>
+            <a:ext cx="3862182" cy="3929157"/>
+          </a:xfrm>
+        </p:spPr>
+      </p:pic>
     </p:spTree>
     <p:extLst>
       <p:ext uri="{BB962C8B-B14F-4D97-AF65-F5344CB8AC3E}">
-        <p14:creationId xmlns:p14="http://schemas.microsoft.com/office/powerpoint/2010/main" val="252267855"/>
+        <p14:creationId xmlns:p14="http://schemas.microsoft.com/office/powerpoint/2010/main" val="509322991"/>
       </p:ext>
     </p:extLst>
   </p:cSld>
@@ -5496,7 +6592,7 @@
           <p:cNvPr id="2" name="Title 1">
             <a:extLst>
               <a:ext uri="{FF2B5EF4-FFF2-40B4-BE49-F238E27FC236}">
-                <a16:creationId xmlns:a16="http://schemas.microsoft.com/office/drawing/2014/main" id="{C5022CC8-2D7E-E642-B45C-1FC6F393B542}"/>
+                <a16:creationId xmlns:a16="http://schemas.microsoft.com/office/drawing/2014/main" id="{77889F0C-B838-9447-919F-A7F85F38BCE9}"/>
               </a:ext>
             </a:extLst>
           </p:cNvPr>
@@ -5509,23 +6605,25 @@
         </p:nvSpPr>
         <p:spPr/>
         <p:txBody>
-          <a:bodyPr/>
+          <a:bodyPr>
+            <a:normAutofit/>
+          </a:bodyPr>
           <a:lstStyle/>
           <a:p>
             <a:pPr algn="ctr"/>
             <a:r>
               <a:rPr lang="en-US" dirty="0"/>
-              <a:t>Results form MLP</a:t>
+              <a:t>Results From Random Forest Classifier </a:t>
             </a:r>
           </a:p>
         </p:txBody>
       </p:sp>
       <p:pic>
         <p:nvPicPr>
-          <p:cNvPr id="5" name="Content Placeholder 4" descr="Chart, line chart&#10;&#10;Description automatically generated">
+          <p:cNvPr id="9" name="Content Placeholder 8" descr="Chart, bar chart, line chart&#10;&#10;Description automatically generated">
             <a:extLst>
               <a:ext uri="{FF2B5EF4-FFF2-40B4-BE49-F238E27FC236}">
-                <a16:creationId xmlns:a16="http://schemas.microsoft.com/office/drawing/2014/main" id="{72B3EEFD-73CF-744D-B2A1-510ABF4DB480}"/>
+                <a16:creationId xmlns:a16="http://schemas.microsoft.com/office/drawing/2014/main" id="{4263FB95-2FE8-7B4B-AB44-E77B8D7FF2C8}"/>
               </a:ext>
             </a:extLst>
           </p:cNvPr>
@@ -5544,17 +6642,64 @@
         </p:blipFill>
         <p:spPr>
           <a:xfrm>
-            <a:off x="838200" y="2819117"/>
-            <a:ext cx="4446651" cy="2858562"/>
+            <a:off x="1051489" y="1868489"/>
+            <a:ext cx="5044511" cy="3282641"/>
           </a:xfrm>
         </p:spPr>
       </p:pic>
+      <p:sp>
+        <p:nvSpPr>
+          <p:cNvPr id="10" name="TextBox 9">
+            <a:extLst>
+              <a:ext uri="{FF2B5EF4-FFF2-40B4-BE49-F238E27FC236}">
+                <a16:creationId xmlns:a16="http://schemas.microsoft.com/office/drawing/2014/main" id="{BE096D36-9960-E54C-96C7-28ECAAC990A2}"/>
+              </a:ext>
+            </a:extLst>
+          </p:cNvPr>
+          <p:cNvSpPr txBox="1"/>
+          <p:nvPr/>
+        </p:nvSpPr>
+        <p:spPr>
+          <a:xfrm>
+            <a:off x="1849244" y="5802868"/>
+            <a:ext cx="8645912" cy="369332"/>
+          </a:xfrm>
+          <a:prstGeom prst="rect">
+            <a:avLst/>
+          </a:prstGeom>
+          <a:noFill/>
+        </p:spPr>
+        <p:txBody>
+          <a:bodyPr wrap="square" rtlCol="0">
+            <a:spAutoFit/>
+          </a:bodyPr>
+          <a:lstStyle/>
+          <a:p>
+            <a:r>
+              <a:rPr lang="en-US" dirty="0" err="1"/>
+              <a:t>Kmer</a:t>
+            </a:r>
+            <a:r>
+              <a:rPr lang="en-US" dirty="0"/>
+              <a:t> Combinations : </a:t>
+            </a:r>
+            <a:r>
+              <a:rPr lang="en-US" dirty="0" err="1"/>
+              <a:t>Dna</a:t>
+            </a:r>
+            <a:r>
+              <a:rPr lang="en-US" dirty="0"/>
+              <a:t>: 1, Zinc:1, Dna:1 Zinc:2, Dna:1 Zinc:3…..DNA:15 Zinc:15</a:t>
+            </a:r>
+          </a:p>
+        </p:txBody>
+      </p:sp>
       <p:pic>
         <p:nvPicPr>
-          <p:cNvPr id="7" name="Picture 6" descr="Chart, line chart&#10;&#10;Description automatically generated">
+          <p:cNvPr id="12" name="Picture 11" descr="Chart, line chart&#10;&#10;Description automatically generated">
             <a:extLst>
               <a:ext uri="{FF2B5EF4-FFF2-40B4-BE49-F238E27FC236}">
-                <a16:creationId xmlns:a16="http://schemas.microsoft.com/office/drawing/2014/main" id="{5DA5E263-338C-B04D-9A52-160E73295EF3}"/>
+                <a16:creationId xmlns:a16="http://schemas.microsoft.com/office/drawing/2014/main" id="{9862DFB8-D972-0E45-B997-B2D9997C8DD5}"/>
               </a:ext>
             </a:extLst>
           </p:cNvPr>
@@ -5571,8 +6716,8 @@
         </p:blipFill>
         <p:spPr>
           <a:xfrm>
-            <a:off x="6699242" y="2849655"/>
-            <a:ext cx="4954056" cy="2828024"/>
+            <a:off x="6906765" y="1857071"/>
+            <a:ext cx="4988488" cy="3305479"/>
           </a:xfrm>
           <a:prstGeom prst="rect">
             <a:avLst/>
@@ -5581,94 +6726,34 @@
       </p:pic>
       <p:sp>
         <p:nvSpPr>
-          <p:cNvPr id="8" name="TextBox 7">
+          <p:cNvPr id="14" name="Rectangle 13">
             <a:extLst>
               <a:ext uri="{FF2B5EF4-FFF2-40B4-BE49-F238E27FC236}">
-                <a16:creationId xmlns:a16="http://schemas.microsoft.com/office/drawing/2014/main" id="{86637EE5-3E37-BD48-8540-5C92C9663745}"/>
+                <a16:creationId xmlns:a16="http://schemas.microsoft.com/office/drawing/2014/main" id="{BFB12A27-626E-BE4A-8CE8-A23BC0B20D86}"/>
               </a:ext>
             </a:extLst>
           </p:cNvPr>
-          <p:cNvSpPr txBox="1"/>
+          <p:cNvSpPr/>
           <p:nvPr/>
         </p:nvSpPr>
         <p:spPr>
           <a:xfrm>
-            <a:off x="838200" y="5663175"/>
-            <a:ext cx="7624678" cy="307777"/>
+            <a:off x="7595643" y="5292333"/>
+            <a:ext cx="3564437" cy="369332"/>
           </a:xfrm>
           <a:prstGeom prst="rect">
             <a:avLst/>
           </a:prstGeom>
-          <a:noFill/>
         </p:spPr>
         <p:txBody>
-          <a:bodyPr wrap="square" rtlCol="0">
+          <a:bodyPr wrap="none">
             <a:spAutoFit/>
           </a:bodyPr>
           <a:lstStyle/>
           <a:p>
             <a:r>
-              <a:rPr lang="en-US" sz="1400" dirty="0"/>
-              <a:t>Activation Function=‘logistic’, solver=‘</a:t>
-            </a:r>
-            <a:r>
-              <a:rPr lang="en-US" sz="1400" dirty="0" err="1"/>
-              <a:t>adam</a:t>
-            </a:r>
-            <a:r>
-              <a:rPr lang="en-US" sz="1400" dirty="0"/>
-              <a:t>’,  alpha=0.0001</a:t>
-            </a:r>
-          </a:p>
-        </p:txBody>
-      </p:sp>
-      <p:sp>
-        <p:nvSpPr>
-          <p:cNvPr id="9" name="TextBox 8">
-            <a:extLst>
-              <a:ext uri="{FF2B5EF4-FFF2-40B4-BE49-F238E27FC236}">
-                <a16:creationId xmlns:a16="http://schemas.microsoft.com/office/drawing/2014/main" id="{ECBDE4B0-0B1C-D345-A487-28CF3A02315E}"/>
-              </a:ext>
-            </a:extLst>
-          </p:cNvPr>
-          <p:cNvSpPr txBox="1"/>
-          <p:nvPr/>
-        </p:nvSpPr>
-        <p:spPr>
-          <a:xfrm>
-            <a:off x="7240592" y="5683668"/>
-            <a:ext cx="4290348" cy="307777"/>
-          </a:xfrm>
-          <a:prstGeom prst="rect">
-            <a:avLst/>
-          </a:prstGeom>
-          <a:noFill/>
-        </p:spPr>
-        <p:txBody>
-          <a:bodyPr wrap="square" rtlCol="0">
-            <a:spAutoFit/>
-          </a:bodyPr>
-          <a:lstStyle/>
-          <a:p>
-            <a:r>
-              <a:rPr lang="en-US" sz="1400" dirty="0"/>
-              <a:t>Activation Function=‘</a:t>
-            </a:r>
-            <a:r>
-              <a:rPr lang="en-US" sz="1400" dirty="0" err="1"/>
-              <a:t>relu</a:t>
-            </a:r>
-            <a:r>
-              <a:rPr lang="en-US" sz="1400" dirty="0"/>
-              <a:t>’, solver=‘</a:t>
-            </a:r>
-            <a:r>
-              <a:rPr lang="en-US" sz="1400" dirty="0" err="1"/>
-              <a:t>adam</a:t>
-            </a:r>
-            <a:r>
-              <a:rPr lang="en-US" sz="1400" dirty="0"/>
-              <a:t>’,  alpha=0.0001</a:t>
+              <a:rPr lang="en-US" dirty="0"/>
+              <a:t>AUC Score: 0.7418016194331983</a:t>
             </a:r>
           </a:p>
         </p:txBody>
@@ -5676,7 +6761,7 @@
     </p:spTree>
     <p:extLst>
       <p:ext uri="{BB962C8B-B14F-4D97-AF65-F5344CB8AC3E}">
-        <p14:creationId xmlns:p14="http://schemas.microsoft.com/office/powerpoint/2010/main" val="2345433897"/>
+        <p14:creationId xmlns:p14="http://schemas.microsoft.com/office/powerpoint/2010/main" val="252267855"/>
       </p:ext>
     </p:extLst>
   </p:cSld>

</xml_diff>